<commit_message>
Update Language Model PPO Diagram.pptx
</commit_message>
<xml_diff>
--- a/Language Model PPO Diagram.pptx
+++ b/Language Model PPO Diagram.pptx
@@ -8,6 +8,8 @@
     <p:sldId id="256" r:id="rId2"/>
     <p:sldId id="257" r:id="rId3"/>
     <p:sldId id="258" r:id="rId4"/>
+    <p:sldId id="260" r:id="rId5"/>
+    <p:sldId id="261" r:id="rId6"/>
   </p:sldIdLst>
   <p:sldSz cx="12192000" cy="6858000"/>
   <p:notesSz cx="6858000" cy="9144000"/>
@@ -106,6 +108,11 @@
       </a:defRPr>
     </a:lvl9pPr>
   </p:defaultTextStyle>
+  <p:extLst>
+    <p:ext uri="{EFAFB233-063F-42B5-8137-9DF3F51BA10A}">
+      <p15:sldGuideLst xmlns:p15="http://schemas.microsoft.com/office/powerpoint/2012/main"/>
+    </p:ext>
+  </p:extLst>
 </p:presentation>
 </file>
 
@@ -256,7 +263,7 @@
           <a:p>
             <a:fld id="{BFFBE6B6-806B-48EE-8EA6-08E5007D1F01}" type="datetimeFigureOut">
               <a:rPr lang="en-US" smtClean="0"/>
-              <a:t>9/13/2022</a:t>
+              <a:t>10/19/2022</a:t>
             </a:fld>
             <a:endParaRPr lang="en-US"/>
           </a:p>
@@ -454,7 +461,7 @@
           <a:p>
             <a:fld id="{BFFBE6B6-806B-48EE-8EA6-08E5007D1F01}" type="datetimeFigureOut">
               <a:rPr lang="en-US" smtClean="0"/>
-              <a:t>9/13/2022</a:t>
+              <a:t>10/19/2022</a:t>
             </a:fld>
             <a:endParaRPr lang="en-US"/>
           </a:p>
@@ -662,7 +669,7 @@
           <a:p>
             <a:fld id="{BFFBE6B6-806B-48EE-8EA6-08E5007D1F01}" type="datetimeFigureOut">
               <a:rPr lang="en-US" smtClean="0"/>
-              <a:t>9/13/2022</a:t>
+              <a:t>10/19/2022</a:t>
             </a:fld>
             <a:endParaRPr lang="en-US"/>
           </a:p>
@@ -860,7 +867,7 @@
           <a:p>
             <a:fld id="{BFFBE6B6-806B-48EE-8EA6-08E5007D1F01}" type="datetimeFigureOut">
               <a:rPr lang="en-US" smtClean="0"/>
-              <a:t>9/13/2022</a:t>
+              <a:t>10/19/2022</a:t>
             </a:fld>
             <a:endParaRPr lang="en-US"/>
           </a:p>
@@ -1135,7 +1142,7 @@
           <a:p>
             <a:fld id="{BFFBE6B6-806B-48EE-8EA6-08E5007D1F01}" type="datetimeFigureOut">
               <a:rPr lang="en-US" smtClean="0"/>
-              <a:t>9/13/2022</a:t>
+              <a:t>10/19/2022</a:t>
             </a:fld>
             <a:endParaRPr lang="en-US"/>
           </a:p>
@@ -1400,7 +1407,7 @@
           <a:p>
             <a:fld id="{BFFBE6B6-806B-48EE-8EA6-08E5007D1F01}" type="datetimeFigureOut">
               <a:rPr lang="en-US" smtClean="0"/>
-              <a:t>9/13/2022</a:t>
+              <a:t>10/19/2022</a:t>
             </a:fld>
             <a:endParaRPr lang="en-US"/>
           </a:p>
@@ -1812,7 +1819,7 @@
           <a:p>
             <a:fld id="{BFFBE6B6-806B-48EE-8EA6-08E5007D1F01}" type="datetimeFigureOut">
               <a:rPr lang="en-US" smtClean="0"/>
-              <a:t>9/13/2022</a:t>
+              <a:t>10/19/2022</a:t>
             </a:fld>
             <a:endParaRPr lang="en-US"/>
           </a:p>
@@ -1953,7 +1960,7 @@
           <a:p>
             <a:fld id="{BFFBE6B6-806B-48EE-8EA6-08E5007D1F01}" type="datetimeFigureOut">
               <a:rPr lang="en-US" smtClean="0"/>
-              <a:t>9/13/2022</a:t>
+              <a:t>10/19/2022</a:t>
             </a:fld>
             <a:endParaRPr lang="en-US"/>
           </a:p>
@@ -2066,7 +2073,7 @@
           <a:p>
             <a:fld id="{BFFBE6B6-806B-48EE-8EA6-08E5007D1F01}" type="datetimeFigureOut">
               <a:rPr lang="en-US" smtClean="0"/>
-              <a:t>9/13/2022</a:t>
+              <a:t>10/19/2022</a:t>
             </a:fld>
             <a:endParaRPr lang="en-US"/>
           </a:p>
@@ -2377,7 +2384,7 @@
           <a:p>
             <a:fld id="{BFFBE6B6-806B-48EE-8EA6-08E5007D1F01}" type="datetimeFigureOut">
               <a:rPr lang="en-US" smtClean="0"/>
-              <a:t>9/13/2022</a:t>
+              <a:t>10/19/2022</a:t>
             </a:fld>
             <a:endParaRPr lang="en-US"/>
           </a:p>
@@ -2665,7 +2672,7 @@
           <a:p>
             <a:fld id="{BFFBE6B6-806B-48EE-8EA6-08E5007D1F01}" type="datetimeFigureOut">
               <a:rPr lang="en-US" smtClean="0"/>
-              <a:t>9/13/2022</a:t>
+              <a:t>10/19/2022</a:t>
             </a:fld>
             <a:endParaRPr lang="en-US"/>
           </a:p>
@@ -2906,7 +2913,7 @@
           <a:p>
             <a:fld id="{BFFBE6B6-806B-48EE-8EA6-08E5007D1F01}" type="datetimeFigureOut">
               <a:rPr lang="en-US" smtClean="0"/>
-              <a:t>9/13/2022</a:t>
+              <a:t>10/19/2022</a:t>
             </a:fld>
             <a:endParaRPr lang="en-US"/>
           </a:p>
@@ -4883,6 +4890,173 @@
           </p:txBody>
         </p:sp>
       </p:grpSp>
+      <p:graphicFrame>
+        <p:nvGraphicFramePr>
+          <p:cNvPr id="3" name="Table 3">
+            <a:extLst>
+              <a:ext uri="{FF2B5EF4-FFF2-40B4-BE49-F238E27FC236}">
+                <a16:creationId xmlns:a16="http://schemas.microsoft.com/office/drawing/2014/main" id="{1E9E87A5-C7CE-55EF-AA6A-A79CE41DE7DB}"/>
+              </a:ext>
+            </a:extLst>
+          </p:cNvPr>
+          <p:cNvGraphicFramePr>
+            <a:graphicFrameLocks noGrp="1"/>
+          </p:cNvGraphicFramePr>
+          <p:nvPr>
+            <p:extLst>
+              <p:ext uri="{D42A27DB-BD31-4B8C-83A1-F6EECF244321}">
+                <p14:modId xmlns:p14="http://schemas.microsoft.com/office/powerpoint/2010/main" val="2667996402"/>
+              </p:ext>
+            </p:extLst>
+          </p:nvPr>
+        </p:nvGraphicFramePr>
+        <p:xfrm>
+          <a:off x="266176" y="226654"/>
+          <a:ext cx="4337484" cy="1559560"/>
+        </p:xfrm>
+        <a:graphic>
+          <a:graphicData uri="http://schemas.openxmlformats.org/drawingml/2006/table">
+            <a:tbl>
+              <a:tblPr firstRow="1" bandRow="1">
+                <a:tableStyleId>{69CF1AB2-1976-4502-BF36-3FF5EA218861}</a:tableStyleId>
+              </a:tblPr>
+              <a:tblGrid>
+                <a:gridCol w="2168742">
+                  <a:extLst>
+                    <a:ext uri="{9D8B030D-6E8A-4147-A177-3AD203B41FA5}">
+                      <a16:colId xmlns:a16="http://schemas.microsoft.com/office/drawing/2014/main" val="403995306"/>
+                    </a:ext>
+                  </a:extLst>
+                </a:gridCol>
+                <a:gridCol w="2168742">
+                  <a:extLst>
+                    <a:ext uri="{9D8B030D-6E8A-4147-A177-3AD203B41FA5}">
+                      <a16:colId xmlns:a16="http://schemas.microsoft.com/office/drawing/2014/main" val="3886721784"/>
+                    </a:ext>
+                  </a:extLst>
+                </a:gridCol>
+              </a:tblGrid>
+              <a:tr h="370840">
+                <a:tc>
+                  <a:txBody>
+                    <a:bodyPr/>
+                    <a:lstStyle/>
+                    <a:p>
+                      <a:r>
+                        <a:rPr lang="en-US" b="0" dirty="0">
+                          <a:solidFill>
+                            <a:schemeClr val="tx1"/>
+                          </a:solidFill>
+                        </a:rPr>
+                        <a:t>RL like features</a:t>
+                      </a:r>
+                    </a:p>
+                  </a:txBody>
+                  <a:tcPr>
+                    <a:noFill/>
+                  </a:tcPr>
+                </a:tc>
+                <a:tc>
+                  <a:txBody>
+                    <a:bodyPr/>
+                    <a:lstStyle/>
+                    <a:p>
+                      <a:r>
+                        <a:rPr lang="en-US" b="0" dirty="0">
+                          <a:solidFill>
+                            <a:schemeClr val="tx1"/>
+                          </a:solidFill>
+                        </a:rPr>
+                        <a:t>Non RL features</a:t>
+                      </a:r>
+                    </a:p>
+                  </a:txBody>
+                  <a:tcPr>
+                    <a:noFill/>
+                  </a:tcPr>
+                </a:tc>
+                <a:extLst>
+                  <a:ext uri="{0D108BD9-81ED-4DB2-BD59-A6C34878D82A}">
+                    <a16:rowId xmlns:a16="http://schemas.microsoft.com/office/drawing/2014/main" val="2664377670"/>
+                  </a:ext>
+                </a:extLst>
+              </a:tr>
+              <a:tr h="370840">
+                <a:tc>
+                  <a:txBody>
+                    <a:bodyPr/>
+                    <a:lstStyle/>
+                    <a:p>
+                      <a:r>
+                        <a:rPr lang="en-US" dirty="0">
+                          <a:solidFill>
+                            <a:schemeClr val="tx1"/>
+                          </a:solidFill>
+                        </a:rPr>
+                        <a:t>On Policy Exploration</a:t>
+                      </a:r>
+                    </a:p>
+                    <a:p>
+                      <a:r>
+                        <a:rPr lang="en-US" dirty="0">
+                          <a:solidFill>
+                            <a:schemeClr val="tx1"/>
+                          </a:solidFill>
+                        </a:rPr>
+                        <a:t>Reward Function</a:t>
+                      </a:r>
+                    </a:p>
+                    <a:p>
+                      <a:r>
+                        <a:rPr lang="en-US" dirty="0">
+                          <a:solidFill>
+                            <a:schemeClr val="tx1"/>
+                          </a:solidFill>
+                        </a:rPr>
+                        <a:t>Approx. Grad of R</a:t>
+                      </a:r>
+                    </a:p>
+                    <a:p>
+                      <a:r>
+                        <a:rPr lang="en-US" dirty="0">
+                          <a:solidFill>
+                            <a:schemeClr val="tx1"/>
+                          </a:solidFill>
+                        </a:rPr>
+                        <a:t>Estimates Value</a:t>
+                      </a:r>
+                    </a:p>
+                  </a:txBody>
+                  <a:tcPr>
+                    <a:noFill/>
+                  </a:tcPr>
+                </a:tc>
+                <a:tc>
+                  <a:txBody>
+                    <a:bodyPr/>
+                    <a:lstStyle/>
+                    <a:p>
+                      <a:endParaRPr lang="en-US" dirty="0">
+                        <a:solidFill>
+                          <a:schemeClr val="tx1"/>
+                        </a:solidFill>
+                      </a:endParaRPr>
+                    </a:p>
+                  </a:txBody>
+                  <a:tcPr>
+                    <a:noFill/>
+                  </a:tcPr>
+                </a:tc>
+                <a:extLst>
+                  <a:ext uri="{0D108BD9-81ED-4DB2-BD59-A6C34878D82A}">
+                    <a16:rowId xmlns:a16="http://schemas.microsoft.com/office/drawing/2014/main" val="630940841"/>
+                  </a:ext>
+                </a:extLst>
+              </a:tr>
+            </a:tbl>
+          </a:graphicData>
+        </a:graphic>
+      </p:graphicFrame>
     </p:spTree>
     <p:extLst>
       <p:ext uri="{BB962C8B-B14F-4D97-AF65-F5344CB8AC3E}">
@@ -4929,7 +5103,12 @@
             <p:ph type="title"/>
           </p:nvPr>
         </p:nvSpPr>
-        <p:spPr/>
+        <p:spPr>
+          <a:xfrm>
+            <a:off x="2171272" y="349580"/>
+            <a:ext cx="10515600" cy="1325563"/>
+          </a:xfrm>
+        </p:spPr>
         <p:txBody>
           <a:bodyPr/>
           <a:lstStyle/>
@@ -5230,7 +5409,7 @@
               <a:p>
                 <a:r>
                   <a:rPr lang="en-US" dirty="0"/>
-                  <a:t>Reject Low Reward Samples</a:t>
+                  <a:t>Reject Low Return Samples</a:t>
                 </a:r>
               </a:p>
             </p:txBody>
@@ -6384,10 +6563,2221 @@
           </p:txBody>
         </p:sp>
       </p:grpSp>
+      <p:graphicFrame>
+        <p:nvGraphicFramePr>
+          <p:cNvPr id="3" name="Table 3">
+            <a:extLst>
+              <a:ext uri="{FF2B5EF4-FFF2-40B4-BE49-F238E27FC236}">
+                <a16:creationId xmlns:a16="http://schemas.microsoft.com/office/drawing/2014/main" id="{999990CD-D5D6-7FB0-F28D-D3438A42C402}"/>
+              </a:ext>
+            </a:extLst>
+          </p:cNvPr>
+          <p:cNvGraphicFramePr>
+            <a:graphicFrameLocks noGrp="1"/>
+          </p:cNvGraphicFramePr>
+          <p:nvPr>
+            <p:extLst>
+              <p:ext uri="{D42A27DB-BD31-4B8C-83A1-F6EECF244321}">
+                <p14:modId xmlns:p14="http://schemas.microsoft.com/office/powerpoint/2010/main" val="1465092384"/>
+              </p:ext>
+            </p:extLst>
+          </p:nvPr>
+        </p:nvGraphicFramePr>
+        <p:xfrm>
+          <a:off x="266176" y="226654"/>
+          <a:ext cx="4337484" cy="1559560"/>
+        </p:xfrm>
+        <a:graphic>
+          <a:graphicData uri="http://schemas.openxmlformats.org/drawingml/2006/table">
+            <a:tbl>
+              <a:tblPr firstRow="1" bandRow="1">
+                <a:tableStyleId>{69CF1AB2-1976-4502-BF36-3FF5EA218861}</a:tableStyleId>
+              </a:tblPr>
+              <a:tblGrid>
+                <a:gridCol w="2168742">
+                  <a:extLst>
+                    <a:ext uri="{9D8B030D-6E8A-4147-A177-3AD203B41FA5}">
+                      <a16:colId xmlns:a16="http://schemas.microsoft.com/office/drawing/2014/main" val="403995306"/>
+                    </a:ext>
+                  </a:extLst>
+                </a:gridCol>
+                <a:gridCol w="2168742">
+                  <a:extLst>
+                    <a:ext uri="{9D8B030D-6E8A-4147-A177-3AD203B41FA5}">
+                      <a16:colId xmlns:a16="http://schemas.microsoft.com/office/drawing/2014/main" val="3886721784"/>
+                    </a:ext>
+                  </a:extLst>
+                </a:gridCol>
+              </a:tblGrid>
+              <a:tr h="370840">
+                <a:tc>
+                  <a:txBody>
+                    <a:bodyPr/>
+                    <a:lstStyle/>
+                    <a:p>
+                      <a:r>
+                        <a:rPr lang="en-US" b="0" dirty="0">
+                          <a:solidFill>
+                            <a:schemeClr val="tx1"/>
+                          </a:solidFill>
+                        </a:rPr>
+                        <a:t>RL like features</a:t>
+                      </a:r>
+                    </a:p>
+                  </a:txBody>
+                  <a:tcPr>
+                    <a:noFill/>
+                  </a:tcPr>
+                </a:tc>
+                <a:tc>
+                  <a:txBody>
+                    <a:bodyPr/>
+                    <a:lstStyle/>
+                    <a:p>
+                      <a:r>
+                        <a:rPr lang="en-US" b="0" dirty="0">
+                          <a:solidFill>
+                            <a:schemeClr val="tx1"/>
+                          </a:solidFill>
+                        </a:rPr>
+                        <a:t>Non RL features</a:t>
+                      </a:r>
+                    </a:p>
+                  </a:txBody>
+                  <a:tcPr>
+                    <a:noFill/>
+                  </a:tcPr>
+                </a:tc>
+                <a:extLst>
+                  <a:ext uri="{0D108BD9-81ED-4DB2-BD59-A6C34878D82A}">
+                    <a16:rowId xmlns:a16="http://schemas.microsoft.com/office/drawing/2014/main" val="2664377670"/>
+                  </a:ext>
+                </a:extLst>
+              </a:tr>
+              <a:tr h="370840">
+                <a:tc>
+                  <a:txBody>
+                    <a:bodyPr/>
+                    <a:lstStyle/>
+                    <a:p>
+                      <a:r>
+                        <a:rPr lang="en-US" dirty="0">
+                          <a:solidFill>
+                            <a:schemeClr val="tx1"/>
+                          </a:solidFill>
+                        </a:rPr>
+                        <a:t>On Policy Exploration</a:t>
+                      </a:r>
+                    </a:p>
+                    <a:p>
+                      <a:r>
+                        <a:rPr lang="en-US" dirty="0">
+                          <a:solidFill>
+                            <a:schemeClr val="tx1"/>
+                          </a:solidFill>
+                        </a:rPr>
+                        <a:t>Reward Function</a:t>
+                      </a:r>
+                    </a:p>
+                  </a:txBody>
+                  <a:tcPr>
+                    <a:noFill/>
+                  </a:tcPr>
+                </a:tc>
+                <a:tc>
+                  <a:txBody>
+                    <a:bodyPr/>
+                    <a:lstStyle/>
+                    <a:p>
+                      <a:r>
+                        <a:rPr lang="en-US" dirty="0">
+                          <a:solidFill>
+                            <a:schemeClr val="tx1"/>
+                          </a:solidFill>
+                        </a:rPr>
+                        <a:t>Predictive Loss</a:t>
+                      </a:r>
+                    </a:p>
+                    <a:p>
+                      <a:r>
+                        <a:rPr lang="en-US" dirty="0">
+                          <a:solidFill>
+                            <a:schemeClr val="tx1"/>
+                          </a:solidFill>
+                        </a:rPr>
+                        <a:t>Optimize reward in the dataset, no gradients on reward</a:t>
+                      </a:r>
+                    </a:p>
+                  </a:txBody>
+                  <a:tcPr>
+                    <a:noFill/>
+                  </a:tcPr>
+                </a:tc>
+                <a:extLst>
+                  <a:ext uri="{0D108BD9-81ED-4DB2-BD59-A6C34878D82A}">
+                    <a16:rowId xmlns:a16="http://schemas.microsoft.com/office/drawing/2014/main" val="630940841"/>
+                  </a:ext>
+                </a:extLst>
+              </a:tr>
+            </a:tbl>
+          </a:graphicData>
+        </a:graphic>
+      </p:graphicFrame>
     </p:spTree>
     <p:extLst>
       <p:ext uri="{BB962C8B-B14F-4D97-AF65-F5344CB8AC3E}">
         <p14:creationId xmlns:p14="http://schemas.microsoft.com/office/powerpoint/2010/main" val="4114747423"/>
+      </p:ext>
+    </p:extLst>
+  </p:cSld>
+  <p:clrMapOvr>
+    <a:masterClrMapping/>
+  </p:clrMapOvr>
+</p:sld>
+</file>
+
+<file path=ppt/slides/slide4.xml><?xml version="1.0" encoding="utf-8"?>
+<p:sld xmlns:a="http://schemas.openxmlformats.org/drawingml/2006/main" xmlns:r="http://schemas.openxmlformats.org/officeDocument/2006/relationships" xmlns:p="http://schemas.openxmlformats.org/presentationml/2006/main">
+  <p:cSld>
+    <p:spTree>
+      <p:nvGrpSpPr>
+        <p:cNvPr id="1" name=""/>
+        <p:cNvGrpSpPr/>
+        <p:nvPr/>
+      </p:nvGrpSpPr>
+      <p:grpSpPr>
+        <a:xfrm>
+          <a:off x="0" y="0"/>
+          <a:ext cx="0" cy="0"/>
+          <a:chOff x="0" y="0"/>
+          <a:chExt cx="0" cy="0"/>
+        </a:xfrm>
+      </p:grpSpPr>
+      <p:sp>
+        <p:nvSpPr>
+          <p:cNvPr id="2" name="Title 1">
+            <a:extLst>
+              <a:ext uri="{FF2B5EF4-FFF2-40B4-BE49-F238E27FC236}">
+                <a16:creationId xmlns:a16="http://schemas.microsoft.com/office/drawing/2014/main" id="{CF00585C-5935-39EE-7E46-1843F4C8808D}"/>
+              </a:ext>
+            </a:extLst>
+          </p:cNvPr>
+          <p:cNvSpPr>
+            <a:spLocks noGrp="1"/>
+          </p:cNvSpPr>
+          <p:nvPr>
+            <p:ph type="title"/>
+          </p:nvPr>
+        </p:nvSpPr>
+        <p:spPr>
+          <a:xfrm>
+            <a:off x="2171272" y="349580"/>
+            <a:ext cx="10515600" cy="1325563"/>
+          </a:xfrm>
+        </p:spPr>
+        <p:txBody>
+          <a:bodyPr/>
+          <a:lstStyle/>
+          <a:p>
+            <a:pPr algn="ctr"/>
+            <a:r>
+              <a:rPr lang="en-US" dirty="0"/>
+              <a:t>Decision Transformer</a:t>
+            </a:r>
+          </a:p>
+        </p:txBody>
+      </p:sp>
+      <p:grpSp>
+        <p:nvGrpSpPr>
+          <p:cNvPr id="7" name="Group 6">
+            <a:extLst>
+              <a:ext uri="{FF2B5EF4-FFF2-40B4-BE49-F238E27FC236}">
+                <a16:creationId xmlns:a16="http://schemas.microsoft.com/office/drawing/2014/main" id="{EFCA9C92-872F-8F1B-5D12-AA96A2958DFB}"/>
+              </a:ext>
+            </a:extLst>
+          </p:cNvPr>
+          <p:cNvGrpSpPr/>
+          <p:nvPr/>
+        </p:nvGrpSpPr>
+        <p:grpSpPr>
+          <a:xfrm>
+            <a:off x="420847" y="2395058"/>
+            <a:ext cx="3261920" cy="893426"/>
+            <a:chOff x="529904" y="2378280"/>
+            <a:chExt cx="3261920" cy="893426"/>
+          </a:xfrm>
+        </p:grpSpPr>
+        <p:sp>
+          <p:nvSpPr>
+            <p:cNvPr id="8" name="Rectangle 7">
+              <a:extLst>
+                <a:ext uri="{FF2B5EF4-FFF2-40B4-BE49-F238E27FC236}">
+                  <a16:creationId xmlns:a16="http://schemas.microsoft.com/office/drawing/2014/main" id="{BAA553FC-E18A-08FA-92D2-C0DE6A453569}"/>
+                </a:ext>
+              </a:extLst>
+            </p:cNvPr>
+            <p:cNvSpPr/>
+            <p:nvPr/>
+          </p:nvSpPr>
+          <p:spPr>
+            <a:xfrm>
+              <a:off x="529904" y="2378280"/>
+              <a:ext cx="3261920" cy="893426"/>
+            </a:xfrm>
+            <a:prstGeom prst="rect">
+              <a:avLst/>
+            </a:prstGeom>
+            <a:noFill/>
+          </p:spPr>
+          <p:style>
+            <a:lnRef idx="2">
+              <a:schemeClr val="accent1">
+                <a:shade val="50000"/>
+              </a:schemeClr>
+            </a:lnRef>
+            <a:fillRef idx="1">
+              <a:schemeClr val="accent1"/>
+            </a:fillRef>
+            <a:effectRef idx="0">
+              <a:schemeClr val="accent1"/>
+            </a:effectRef>
+            <a:fontRef idx="minor">
+              <a:schemeClr val="lt1"/>
+            </a:fontRef>
+          </p:style>
+          <p:txBody>
+            <a:bodyPr rtlCol="0" anchor="ctr"/>
+            <a:lstStyle/>
+            <a:p>
+              <a:pPr algn="ctr"/>
+              <a:endParaRPr lang="en-US"/>
+            </a:p>
+          </p:txBody>
+        </p:sp>
+        <p:sp>
+          <p:nvSpPr>
+            <p:cNvPr id="9" name="TextBox 8">
+              <a:extLst>
+                <a:ext uri="{FF2B5EF4-FFF2-40B4-BE49-F238E27FC236}">
+                  <a16:creationId xmlns:a16="http://schemas.microsoft.com/office/drawing/2014/main" id="{03E571DA-EC71-657B-211F-A3ED2024BE67}"/>
+                </a:ext>
+              </a:extLst>
+            </p:cNvPr>
+            <p:cNvSpPr txBox="1"/>
+            <p:nvPr/>
+          </p:nvSpPr>
+          <p:spPr>
+            <a:xfrm>
+              <a:off x="784180" y="2612635"/>
+              <a:ext cx="2781787" cy="369332"/>
+            </a:xfrm>
+            <a:prstGeom prst="rect">
+              <a:avLst/>
+            </a:prstGeom>
+            <a:noFill/>
+          </p:spPr>
+          <p:txBody>
+            <a:bodyPr wrap="none" rtlCol="0">
+              <a:spAutoFit/>
+            </a:bodyPr>
+            <a:lstStyle/>
+            <a:p>
+              <a:r>
+                <a:rPr lang="en-US" dirty="0"/>
+                <a:t>Generate Random Samples</a:t>
+              </a:r>
+            </a:p>
+          </p:txBody>
+        </p:sp>
+      </p:grpSp>
+      <p:grpSp>
+        <p:nvGrpSpPr>
+          <p:cNvPr id="14" name="Group 13">
+            <a:extLst>
+              <a:ext uri="{FF2B5EF4-FFF2-40B4-BE49-F238E27FC236}">
+                <a16:creationId xmlns:a16="http://schemas.microsoft.com/office/drawing/2014/main" id="{58917F8C-7100-A8BC-FB9D-8E15C478E819}"/>
+              </a:ext>
+            </a:extLst>
+          </p:cNvPr>
+          <p:cNvGrpSpPr/>
+          <p:nvPr/>
+        </p:nvGrpSpPr>
+        <p:grpSpPr>
+          <a:xfrm>
+            <a:off x="4485934" y="2430380"/>
+            <a:ext cx="2943138" cy="998488"/>
+            <a:chOff x="529904" y="2378280"/>
+            <a:chExt cx="3261920" cy="893426"/>
+          </a:xfrm>
+        </p:grpSpPr>
+        <p:sp>
+          <p:nvSpPr>
+            <p:cNvPr id="17" name="Rectangle 16">
+              <a:extLst>
+                <a:ext uri="{FF2B5EF4-FFF2-40B4-BE49-F238E27FC236}">
+                  <a16:creationId xmlns:a16="http://schemas.microsoft.com/office/drawing/2014/main" id="{15A6B431-7609-07F7-085E-57179654548E}"/>
+                </a:ext>
+              </a:extLst>
+            </p:cNvPr>
+            <p:cNvSpPr/>
+            <p:nvPr/>
+          </p:nvSpPr>
+          <p:spPr>
+            <a:xfrm>
+              <a:off x="529904" y="2378280"/>
+              <a:ext cx="3261920" cy="893426"/>
+            </a:xfrm>
+            <a:prstGeom prst="rect">
+              <a:avLst/>
+            </a:prstGeom>
+            <a:noFill/>
+          </p:spPr>
+          <p:style>
+            <a:lnRef idx="2">
+              <a:schemeClr val="accent1">
+                <a:shade val="50000"/>
+              </a:schemeClr>
+            </a:lnRef>
+            <a:fillRef idx="1">
+              <a:schemeClr val="accent1"/>
+            </a:fillRef>
+            <a:effectRef idx="0">
+              <a:schemeClr val="accent1"/>
+            </a:effectRef>
+            <a:fontRef idx="minor">
+              <a:schemeClr val="lt1"/>
+            </a:fontRef>
+          </p:style>
+          <p:txBody>
+            <a:bodyPr rtlCol="0" anchor="ctr"/>
+            <a:lstStyle/>
+            <a:p>
+              <a:pPr algn="ctr"/>
+              <a:endParaRPr lang="en-US"/>
+            </a:p>
+          </p:txBody>
+        </p:sp>
+        <p:sp>
+          <p:nvSpPr>
+            <p:cNvPr id="18" name="TextBox 17">
+              <a:extLst>
+                <a:ext uri="{FF2B5EF4-FFF2-40B4-BE49-F238E27FC236}">
+                  <a16:creationId xmlns:a16="http://schemas.microsoft.com/office/drawing/2014/main" id="{475E1D29-2C87-CDAF-139C-DE8930CDE232}"/>
+                </a:ext>
+              </a:extLst>
+            </p:cNvPr>
+            <p:cNvSpPr txBox="1"/>
+            <p:nvPr/>
+          </p:nvSpPr>
+          <p:spPr>
+            <a:xfrm>
+              <a:off x="804939" y="2416411"/>
+              <a:ext cx="2782416" cy="364135"/>
+            </a:xfrm>
+            <a:prstGeom prst="rect">
+              <a:avLst/>
+            </a:prstGeom>
+            <a:noFill/>
+          </p:spPr>
+          <p:txBody>
+            <a:bodyPr wrap="none" rtlCol="0">
+              <a:spAutoFit/>
+            </a:bodyPr>
+            <a:lstStyle/>
+            <a:p>
+              <a:r>
+                <a:rPr lang="en-US" dirty="0"/>
+                <a:t>Add either Rewards or</a:t>
+              </a:r>
+            </a:p>
+            <a:p>
+              <a:r>
+                <a:rPr lang="en-US" dirty="0"/>
+                <a:t>Returns to the top of the</a:t>
+              </a:r>
+            </a:p>
+            <a:p>
+              <a:r>
+                <a:rPr lang="en-US" dirty="0"/>
+                <a:t>Sample</a:t>
+              </a:r>
+            </a:p>
+          </p:txBody>
+        </p:sp>
+      </p:grpSp>
+      <p:grpSp>
+        <p:nvGrpSpPr>
+          <p:cNvPr id="19" name="Group 18">
+            <a:extLst>
+              <a:ext uri="{FF2B5EF4-FFF2-40B4-BE49-F238E27FC236}">
+                <a16:creationId xmlns:a16="http://schemas.microsoft.com/office/drawing/2014/main" id="{D838776B-7B47-15A1-0F03-BB92CE2FD912}"/>
+              </a:ext>
+            </a:extLst>
+          </p:cNvPr>
+          <p:cNvGrpSpPr/>
+          <p:nvPr/>
+        </p:nvGrpSpPr>
+        <p:grpSpPr>
+          <a:xfrm>
+            <a:off x="8453761" y="2470042"/>
+            <a:ext cx="3628861" cy="739889"/>
+            <a:chOff x="7234106" y="2291241"/>
+            <a:chExt cx="2943138" cy="1643194"/>
+          </a:xfrm>
+        </p:grpSpPr>
+        <p:grpSp>
+          <p:nvGrpSpPr>
+            <p:cNvPr id="20" name="Group 19">
+              <a:extLst>
+                <a:ext uri="{FF2B5EF4-FFF2-40B4-BE49-F238E27FC236}">
+                  <a16:creationId xmlns:a16="http://schemas.microsoft.com/office/drawing/2014/main" id="{40AC865A-E5B6-ED96-59CE-ABEBB81AF24C}"/>
+                </a:ext>
+              </a:extLst>
+            </p:cNvPr>
+            <p:cNvGrpSpPr/>
+            <p:nvPr/>
+          </p:nvGrpSpPr>
+          <p:grpSpPr>
+            <a:xfrm>
+              <a:off x="7234106" y="2395056"/>
+              <a:ext cx="2943138" cy="1539379"/>
+              <a:chOff x="529904" y="2378280"/>
+              <a:chExt cx="3261920" cy="893426"/>
+            </a:xfrm>
+          </p:grpSpPr>
+          <p:sp>
+            <p:nvSpPr>
+              <p:cNvPr id="24" name="Rectangle 23">
+                <a:extLst>
+                  <a:ext uri="{FF2B5EF4-FFF2-40B4-BE49-F238E27FC236}">
+                    <a16:creationId xmlns:a16="http://schemas.microsoft.com/office/drawing/2014/main" id="{39BE728A-50E7-3E08-E91C-69AF42434D0F}"/>
+                  </a:ext>
+                </a:extLst>
+              </p:cNvPr>
+              <p:cNvSpPr/>
+              <p:nvPr/>
+            </p:nvSpPr>
+            <p:spPr>
+              <a:xfrm>
+                <a:off x="529904" y="2378280"/>
+                <a:ext cx="3261920" cy="893426"/>
+              </a:xfrm>
+              <a:prstGeom prst="rect">
+                <a:avLst/>
+              </a:prstGeom>
+              <a:noFill/>
+            </p:spPr>
+            <p:style>
+              <a:lnRef idx="2">
+                <a:schemeClr val="accent1">
+                  <a:shade val="50000"/>
+                </a:schemeClr>
+              </a:lnRef>
+              <a:fillRef idx="1">
+                <a:schemeClr val="accent1"/>
+              </a:fillRef>
+              <a:effectRef idx="0">
+                <a:schemeClr val="accent1"/>
+              </a:effectRef>
+              <a:fontRef idx="minor">
+                <a:schemeClr val="lt1"/>
+              </a:fontRef>
+            </p:style>
+            <p:txBody>
+              <a:bodyPr rtlCol="0" anchor="ctr"/>
+              <a:lstStyle/>
+              <a:p>
+                <a:pPr algn="ctr"/>
+                <a:endParaRPr lang="en-US"/>
+              </a:p>
+            </p:txBody>
+          </p:sp>
+          <p:sp>
+            <p:nvSpPr>
+              <p:cNvPr id="25" name="TextBox 24">
+                <a:extLst>
+                  <a:ext uri="{FF2B5EF4-FFF2-40B4-BE49-F238E27FC236}">
+                    <a16:creationId xmlns:a16="http://schemas.microsoft.com/office/drawing/2014/main" id="{F1D32C18-49AB-6004-D146-3FEA6C2216EF}"/>
+                  </a:ext>
+                </a:extLst>
+              </p:cNvPr>
+              <p:cNvSpPr txBox="1"/>
+              <p:nvPr/>
+            </p:nvSpPr>
+            <p:spPr>
+              <a:xfrm>
+                <a:off x="529904" y="2554460"/>
+                <a:ext cx="2746839" cy="298704"/>
+              </a:xfrm>
+              <a:prstGeom prst="rect">
+                <a:avLst/>
+              </a:prstGeom>
+              <a:noFill/>
+            </p:spPr>
+            <p:txBody>
+              <a:bodyPr wrap="none" rtlCol="0">
+                <a:spAutoFit/>
+              </a:bodyPr>
+              <a:lstStyle/>
+              <a:p>
+                <a:r>
+                  <a:rPr lang="en-US" dirty="0"/>
+                  <a:t>Self-Supervise Train          from </a:t>
+                </a:r>
+              </a:p>
+              <a:p>
+                <a:endParaRPr lang="en-US" dirty="0"/>
+              </a:p>
+            </p:txBody>
+          </p:sp>
+        </p:grpSp>
+        <p:sp>
+          <p:nvSpPr>
+            <p:cNvPr id="21" name="TextBox 20">
+              <a:extLst>
+                <a:ext uri="{FF2B5EF4-FFF2-40B4-BE49-F238E27FC236}">
+                  <a16:creationId xmlns:a16="http://schemas.microsoft.com/office/drawing/2014/main" id="{482F80EC-7544-ECFB-3456-44362060CFB2}"/>
+                </a:ext>
+              </a:extLst>
+            </p:cNvPr>
+            <p:cNvSpPr txBox="1"/>
+            <p:nvPr/>
+          </p:nvSpPr>
+          <p:spPr>
+            <a:xfrm>
+              <a:off x="8810168" y="2308293"/>
+              <a:ext cx="487634" cy="707886"/>
+            </a:xfrm>
+            <a:prstGeom prst="rect">
+              <a:avLst/>
+            </a:prstGeom>
+            <a:noFill/>
+          </p:spPr>
+          <p:txBody>
+            <a:bodyPr wrap="none" rtlCol="0">
+              <a:spAutoFit/>
+            </a:bodyPr>
+            <a:lstStyle/>
+            <a:p>
+              <a:r>
+                <a:rPr lang="en-US" sz="4000" dirty="0">
+                  <a:latin typeface="Algerian" panose="020B0604020202020204" pitchFamily="82" charset="0"/>
+                </a:rPr>
+                <a:t>P</a:t>
+              </a:r>
+            </a:p>
+          </p:txBody>
+        </p:sp>
+        <p:sp>
+          <p:nvSpPr>
+            <p:cNvPr id="22" name="TextBox 21">
+              <a:extLst>
+                <a:ext uri="{FF2B5EF4-FFF2-40B4-BE49-F238E27FC236}">
+                  <a16:creationId xmlns:a16="http://schemas.microsoft.com/office/drawing/2014/main" id="{F742BD0C-3CE1-97F6-0201-AF8A35A65243}"/>
+                </a:ext>
+              </a:extLst>
+            </p:cNvPr>
+            <p:cNvSpPr txBox="1"/>
+            <p:nvPr/>
+          </p:nvSpPr>
+          <p:spPr>
+            <a:xfrm>
+              <a:off x="9630287" y="2291241"/>
+              <a:ext cx="513282" cy="707886"/>
+            </a:xfrm>
+            <a:prstGeom prst="rect">
+              <a:avLst/>
+            </a:prstGeom>
+            <a:noFill/>
+          </p:spPr>
+          <p:txBody>
+            <a:bodyPr wrap="none" rtlCol="0">
+              <a:spAutoFit/>
+            </a:bodyPr>
+            <a:lstStyle/>
+            <a:p>
+              <a:r>
+                <a:rPr lang="en-US" sz="4000" dirty="0">
+                  <a:latin typeface="Algerian" panose="020B0604020202020204" pitchFamily="82" charset="0"/>
+                </a:rPr>
+                <a:t>Q</a:t>
+              </a:r>
+            </a:p>
+          </p:txBody>
+        </p:sp>
+      </p:grpSp>
+      <p:sp>
+        <p:nvSpPr>
+          <p:cNvPr id="26" name="Arrow: Right 25">
+            <a:extLst>
+              <a:ext uri="{FF2B5EF4-FFF2-40B4-BE49-F238E27FC236}">
+                <a16:creationId xmlns:a16="http://schemas.microsoft.com/office/drawing/2014/main" id="{719F79D0-0F81-46C8-7CD9-15EF65DB63E1}"/>
+              </a:ext>
+            </a:extLst>
+          </p:cNvPr>
+          <p:cNvSpPr/>
+          <p:nvPr/>
+        </p:nvSpPr>
+        <p:spPr>
+          <a:xfrm>
+            <a:off x="3788935" y="2667231"/>
+            <a:ext cx="606772" cy="378982"/>
+          </a:xfrm>
+          <a:prstGeom prst="rightArrow">
+            <a:avLst/>
+          </a:prstGeom>
+          <a:noFill/>
+        </p:spPr>
+        <p:style>
+          <a:lnRef idx="2">
+            <a:schemeClr val="accent1">
+              <a:shade val="50000"/>
+            </a:schemeClr>
+          </a:lnRef>
+          <a:fillRef idx="1">
+            <a:schemeClr val="accent1"/>
+          </a:fillRef>
+          <a:effectRef idx="0">
+            <a:schemeClr val="accent1"/>
+          </a:effectRef>
+          <a:fontRef idx="minor">
+            <a:schemeClr val="lt1"/>
+          </a:fontRef>
+        </p:style>
+        <p:txBody>
+          <a:bodyPr rtlCol="0" anchor="ctr"/>
+          <a:lstStyle/>
+          <a:p>
+            <a:pPr algn="ctr"/>
+            <a:endParaRPr lang="en-US"/>
+          </a:p>
+        </p:txBody>
+      </p:sp>
+      <p:sp>
+        <p:nvSpPr>
+          <p:cNvPr id="27" name="Arrow: Circular 26">
+            <a:extLst>
+              <a:ext uri="{FF2B5EF4-FFF2-40B4-BE49-F238E27FC236}">
+                <a16:creationId xmlns:a16="http://schemas.microsoft.com/office/drawing/2014/main" id="{7E3B2501-BBD4-949B-9298-96EA9C00A893}"/>
+              </a:ext>
+            </a:extLst>
+          </p:cNvPr>
+          <p:cNvSpPr/>
+          <p:nvPr/>
+        </p:nvSpPr>
+        <p:spPr>
+          <a:xfrm>
+            <a:off x="9223450" y="1631380"/>
+            <a:ext cx="1096912" cy="1246323"/>
+          </a:xfrm>
+          <a:prstGeom prst="circularArrow">
+            <a:avLst/>
+          </a:prstGeom>
+          <a:noFill/>
+        </p:spPr>
+        <p:style>
+          <a:lnRef idx="2">
+            <a:schemeClr val="accent1">
+              <a:shade val="50000"/>
+            </a:schemeClr>
+          </a:lnRef>
+          <a:fillRef idx="1">
+            <a:schemeClr val="accent1"/>
+          </a:fillRef>
+          <a:effectRef idx="0">
+            <a:schemeClr val="accent1"/>
+          </a:effectRef>
+          <a:fontRef idx="minor">
+            <a:schemeClr val="lt1"/>
+          </a:fontRef>
+        </p:style>
+        <p:txBody>
+          <a:bodyPr rtlCol="0" anchor="ctr"/>
+          <a:lstStyle/>
+          <a:p>
+            <a:pPr algn="ctr"/>
+            <a:endParaRPr lang="en-US" dirty="0">
+              <a:solidFill>
+                <a:schemeClr val="tx1"/>
+              </a:solidFill>
+            </a:endParaRPr>
+          </a:p>
+        </p:txBody>
+      </p:sp>
+      <p:sp>
+        <p:nvSpPr>
+          <p:cNvPr id="28" name="TextBox 27">
+            <a:extLst>
+              <a:ext uri="{FF2B5EF4-FFF2-40B4-BE49-F238E27FC236}">
+                <a16:creationId xmlns:a16="http://schemas.microsoft.com/office/drawing/2014/main" id="{E7A2194D-72F4-1A8B-88CA-B8F728CCC30A}"/>
+              </a:ext>
+            </a:extLst>
+          </p:cNvPr>
+          <p:cNvSpPr txBox="1"/>
+          <p:nvPr/>
+        </p:nvSpPr>
+        <p:spPr>
+          <a:xfrm>
+            <a:off x="9605565" y="1927176"/>
+            <a:ext cx="301686" cy="369332"/>
+          </a:xfrm>
+          <a:prstGeom prst="rect">
+            <a:avLst/>
+          </a:prstGeom>
+          <a:noFill/>
+        </p:spPr>
+        <p:txBody>
+          <a:bodyPr wrap="none" rtlCol="0">
+            <a:spAutoFit/>
+          </a:bodyPr>
+          <a:lstStyle/>
+          <a:p>
+            <a:r>
+              <a:rPr lang="en-US" dirty="0"/>
+              <a:t>1</a:t>
+            </a:r>
+          </a:p>
+        </p:txBody>
+      </p:sp>
+      <p:sp>
+        <p:nvSpPr>
+          <p:cNvPr id="29" name="Arrow: Right 28">
+            <a:extLst>
+              <a:ext uri="{FF2B5EF4-FFF2-40B4-BE49-F238E27FC236}">
+                <a16:creationId xmlns:a16="http://schemas.microsoft.com/office/drawing/2014/main" id="{DA5A613D-E728-7337-8346-1A222BB4346F}"/>
+              </a:ext>
+            </a:extLst>
+          </p:cNvPr>
+          <p:cNvSpPr/>
+          <p:nvPr/>
+        </p:nvSpPr>
+        <p:spPr>
+          <a:xfrm>
+            <a:off x="7618145" y="2728786"/>
+            <a:ext cx="606772" cy="378982"/>
+          </a:xfrm>
+          <a:prstGeom prst="rightArrow">
+            <a:avLst/>
+          </a:prstGeom>
+          <a:noFill/>
+        </p:spPr>
+        <p:style>
+          <a:lnRef idx="2">
+            <a:schemeClr val="accent1">
+              <a:shade val="50000"/>
+            </a:schemeClr>
+          </a:lnRef>
+          <a:fillRef idx="1">
+            <a:schemeClr val="accent1"/>
+          </a:fillRef>
+          <a:effectRef idx="0">
+            <a:schemeClr val="accent1"/>
+          </a:effectRef>
+          <a:fontRef idx="minor">
+            <a:schemeClr val="lt1"/>
+          </a:fontRef>
+        </p:style>
+        <p:txBody>
+          <a:bodyPr rtlCol="0" anchor="ctr"/>
+          <a:lstStyle/>
+          <a:p>
+            <a:pPr algn="ctr"/>
+            <a:endParaRPr lang="en-US"/>
+          </a:p>
+        </p:txBody>
+      </p:sp>
+      <p:grpSp>
+        <p:nvGrpSpPr>
+          <p:cNvPr id="30" name="Group 29">
+            <a:extLst>
+              <a:ext uri="{FF2B5EF4-FFF2-40B4-BE49-F238E27FC236}">
+                <a16:creationId xmlns:a16="http://schemas.microsoft.com/office/drawing/2014/main" id="{7F68789B-3B03-85BD-EF03-9C76DC99E3F7}"/>
+              </a:ext>
+            </a:extLst>
+          </p:cNvPr>
+          <p:cNvGrpSpPr/>
+          <p:nvPr/>
+        </p:nvGrpSpPr>
+        <p:grpSpPr>
+          <a:xfrm>
+            <a:off x="266176" y="4679735"/>
+            <a:ext cx="2843868" cy="1858675"/>
+            <a:chOff x="9244668" y="102508"/>
+            <a:chExt cx="2843868" cy="1858675"/>
+          </a:xfrm>
+        </p:grpSpPr>
+        <p:sp>
+          <p:nvSpPr>
+            <p:cNvPr id="31" name="TextBox 30">
+              <a:extLst>
+                <a:ext uri="{FF2B5EF4-FFF2-40B4-BE49-F238E27FC236}">
+                  <a16:creationId xmlns:a16="http://schemas.microsoft.com/office/drawing/2014/main" id="{4BCAFDDB-08C3-B443-2A7E-34C84735C351}"/>
+                </a:ext>
+              </a:extLst>
+            </p:cNvPr>
+            <p:cNvSpPr txBox="1"/>
+            <p:nvPr/>
+          </p:nvSpPr>
+          <p:spPr>
+            <a:xfrm>
+              <a:off x="11320230" y="102508"/>
+              <a:ext cx="510076" cy="707886"/>
+            </a:xfrm>
+            <a:prstGeom prst="rect">
+              <a:avLst/>
+            </a:prstGeom>
+            <a:noFill/>
+          </p:spPr>
+          <p:txBody>
+            <a:bodyPr wrap="none" rtlCol="0">
+              <a:spAutoFit/>
+            </a:bodyPr>
+            <a:lstStyle/>
+            <a:p>
+              <a:r>
+                <a:rPr lang="en-US" sz="4000" dirty="0">
+                  <a:latin typeface="Algerian" panose="020B0604020202020204" pitchFamily="82" charset="0"/>
+                </a:rPr>
+                <a:t>R</a:t>
+              </a:r>
+            </a:p>
+          </p:txBody>
+        </p:sp>
+        <p:sp>
+          <p:nvSpPr>
+            <p:cNvPr id="32" name="TextBox 31">
+              <a:extLst>
+                <a:ext uri="{FF2B5EF4-FFF2-40B4-BE49-F238E27FC236}">
+                  <a16:creationId xmlns:a16="http://schemas.microsoft.com/office/drawing/2014/main" id="{916ED44E-03CF-4C71-7C58-4202DF7C6DB5}"/>
+                </a:ext>
+              </a:extLst>
+            </p:cNvPr>
+            <p:cNvSpPr txBox="1"/>
+            <p:nvPr/>
+          </p:nvSpPr>
+          <p:spPr>
+            <a:xfrm>
+              <a:off x="9468552" y="271785"/>
+              <a:ext cx="2139192" cy="369332"/>
+            </a:xfrm>
+            <a:prstGeom prst="rect">
+              <a:avLst/>
+            </a:prstGeom>
+            <a:noFill/>
+          </p:spPr>
+          <p:txBody>
+            <a:bodyPr wrap="square" rtlCol="0">
+              <a:spAutoFit/>
+            </a:bodyPr>
+            <a:lstStyle/>
+            <a:p>
+              <a:r>
+                <a:rPr lang="en-US" dirty="0"/>
+                <a:t>Reference Model</a:t>
+              </a:r>
+            </a:p>
+          </p:txBody>
+        </p:sp>
+        <p:sp>
+          <p:nvSpPr>
+            <p:cNvPr id="33" name="TextBox 32">
+              <a:extLst>
+                <a:ext uri="{FF2B5EF4-FFF2-40B4-BE49-F238E27FC236}">
+                  <a16:creationId xmlns:a16="http://schemas.microsoft.com/office/drawing/2014/main" id="{C0207A33-81BB-E189-8C15-D1E78BE7993E}"/>
+                </a:ext>
+              </a:extLst>
+            </p:cNvPr>
+            <p:cNvSpPr txBox="1"/>
+            <p:nvPr/>
+          </p:nvSpPr>
+          <p:spPr>
+            <a:xfrm>
+              <a:off x="11320230" y="641117"/>
+              <a:ext cx="487634" cy="707886"/>
+            </a:xfrm>
+            <a:prstGeom prst="rect">
+              <a:avLst/>
+            </a:prstGeom>
+            <a:noFill/>
+          </p:spPr>
+          <p:txBody>
+            <a:bodyPr wrap="none" rtlCol="0">
+              <a:spAutoFit/>
+            </a:bodyPr>
+            <a:lstStyle/>
+            <a:p>
+              <a:r>
+                <a:rPr lang="en-US" sz="4000" dirty="0">
+                  <a:latin typeface="Algerian" panose="020B0604020202020204" pitchFamily="82" charset="0"/>
+                </a:rPr>
+                <a:t>P</a:t>
+              </a:r>
+            </a:p>
+          </p:txBody>
+        </p:sp>
+        <p:sp>
+          <p:nvSpPr>
+            <p:cNvPr id="34" name="TextBox 33">
+              <a:extLst>
+                <a:ext uri="{FF2B5EF4-FFF2-40B4-BE49-F238E27FC236}">
+                  <a16:creationId xmlns:a16="http://schemas.microsoft.com/office/drawing/2014/main" id="{60B74FC6-272E-1E7D-CDF0-AA8FCEE3507B}"/>
+                </a:ext>
+              </a:extLst>
+            </p:cNvPr>
+            <p:cNvSpPr txBox="1"/>
+            <p:nvPr/>
+          </p:nvSpPr>
+          <p:spPr>
+            <a:xfrm>
+              <a:off x="9468552" y="810394"/>
+              <a:ext cx="2139192" cy="369332"/>
+            </a:xfrm>
+            <a:prstGeom prst="rect">
+              <a:avLst/>
+            </a:prstGeom>
+            <a:noFill/>
+          </p:spPr>
+          <p:txBody>
+            <a:bodyPr wrap="square" rtlCol="0">
+              <a:spAutoFit/>
+            </a:bodyPr>
+            <a:lstStyle/>
+            <a:p>
+              <a:r>
+                <a:rPr lang="en-US" dirty="0"/>
+                <a:t>Current Model</a:t>
+              </a:r>
+            </a:p>
+          </p:txBody>
+        </p:sp>
+        <p:sp>
+          <p:nvSpPr>
+            <p:cNvPr id="35" name="TextBox 34">
+              <a:extLst>
+                <a:ext uri="{FF2B5EF4-FFF2-40B4-BE49-F238E27FC236}">
+                  <a16:creationId xmlns:a16="http://schemas.microsoft.com/office/drawing/2014/main" id="{D4DB3BD0-6CA6-A5BC-F54F-9E13BF471F3C}"/>
+                </a:ext>
+              </a:extLst>
+            </p:cNvPr>
+            <p:cNvSpPr txBox="1"/>
+            <p:nvPr/>
+          </p:nvSpPr>
+          <p:spPr>
+            <a:xfrm>
+              <a:off x="11305014" y="1164337"/>
+              <a:ext cx="513282" cy="707886"/>
+            </a:xfrm>
+            <a:prstGeom prst="rect">
+              <a:avLst/>
+            </a:prstGeom>
+            <a:noFill/>
+          </p:spPr>
+          <p:txBody>
+            <a:bodyPr wrap="none" rtlCol="0">
+              <a:spAutoFit/>
+            </a:bodyPr>
+            <a:lstStyle/>
+            <a:p>
+              <a:r>
+                <a:rPr lang="en-US" sz="4000" dirty="0">
+                  <a:latin typeface="Algerian" panose="020B0604020202020204" pitchFamily="82" charset="0"/>
+                </a:rPr>
+                <a:t>Q</a:t>
+              </a:r>
+            </a:p>
+          </p:txBody>
+        </p:sp>
+        <p:sp>
+          <p:nvSpPr>
+            <p:cNvPr id="36" name="TextBox 35">
+              <a:extLst>
+                <a:ext uri="{FF2B5EF4-FFF2-40B4-BE49-F238E27FC236}">
+                  <a16:creationId xmlns:a16="http://schemas.microsoft.com/office/drawing/2014/main" id="{BBFE9A7E-C3D0-E5AE-A47A-8ED6842B07E4}"/>
+                </a:ext>
+              </a:extLst>
+            </p:cNvPr>
+            <p:cNvSpPr txBox="1"/>
+            <p:nvPr/>
+          </p:nvSpPr>
+          <p:spPr>
+            <a:xfrm>
+              <a:off x="9468552" y="1225892"/>
+              <a:ext cx="2139192" cy="615553"/>
+            </a:xfrm>
+            <a:prstGeom prst="rect">
+              <a:avLst/>
+            </a:prstGeom>
+            <a:noFill/>
+          </p:spPr>
+          <p:txBody>
+            <a:bodyPr wrap="square" rtlCol="0">
+              <a:spAutoFit/>
+            </a:bodyPr>
+            <a:lstStyle/>
+            <a:p>
+              <a:r>
+                <a:rPr lang="en-US" dirty="0"/>
+                <a:t>Last Model</a:t>
+              </a:r>
+            </a:p>
+            <a:p>
+              <a:r>
+                <a:rPr lang="en-US" sz="800" dirty="0"/>
+                <a:t>*Cached values only </a:t>
+              </a:r>
+            </a:p>
+            <a:p>
+              <a:r>
+                <a:rPr lang="en-US" sz="800" dirty="0"/>
+                <a:t>not stored as a model</a:t>
+              </a:r>
+            </a:p>
+          </p:txBody>
+        </p:sp>
+        <p:sp>
+          <p:nvSpPr>
+            <p:cNvPr id="37" name="Rectangle 36">
+              <a:extLst>
+                <a:ext uri="{FF2B5EF4-FFF2-40B4-BE49-F238E27FC236}">
+                  <a16:creationId xmlns:a16="http://schemas.microsoft.com/office/drawing/2014/main" id="{72FA7BD8-5B4C-2420-AD18-323C25ADB765}"/>
+                </a:ext>
+              </a:extLst>
+            </p:cNvPr>
+            <p:cNvSpPr/>
+            <p:nvPr/>
+          </p:nvSpPr>
+          <p:spPr>
+            <a:xfrm>
+              <a:off x="9244668" y="102508"/>
+              <a:ext cx="2843868" cy="1858675"/>
+            </a:xfrm>
+            <a:prstGeom prst="rect">
+              <a:avLst/>
+            </a:prstGeom>
+            <a:noFill/>
+          </p:spPr>
+          <p:style>
+            <a:lnRef idx="2">
+              <a:schemeClr val="accent1">
+                <a:shade val="50000"/>
+              </a:schemeClr>
+            </a:lnRef>
+            <a:fillRef idx="1">
+              <a:schemeClr val="accent1"/>
+            </a:fillRef>
+            <a:effectRef idx="0">
+              <a:schemeClr val="accent1"/>
+            </a:effectRef>
+            <a:fontRef idx="minor">
+              <a:schemeClr val="lt1"/>
+            </a:fontRef>
+          </p:style>
+          <p:txBody>
+            <a:bodyPr rtlCol="0" anchor="ctr"/>
+            <a:lstStyle/>
+            <a:p>
+              <a:pPr algn="ctr"/>
+              <a:endParaRPr lang="en-US"/>
+            </a:p>
+          </p:txBody>
+        </p:sp>
+      </p:grpSp>
+      <p:sp>
+        <p:nvSpPr>
+          <p:cNvPr id="42" name="Arrow: Right 41">
+            <a:extLst>
+              <a:ext uri="{FF2B5EF4-FFF2-40B4-BE49-F238E27FC236}">
+                <a16:creationId xmlns:a16="http://schemas.microsoft.com/office/drawing/2014/main" id="{46F5F5F3-380B-AD54-4888-F8D8059A9499}"/>
+              </a:ext>
+            </a:extLst>
+          </p:cNvPr>
+          <p:cNvSpPr/>
+          <p:nvPr/>
+        </p:nvSpPr>
+        <p:spPr>
+          <a:xfrm rot="7932903">
+            <a:off x="7455983" y="4274004"/>
+            <a:ext cx="2604256" cy="378982"/>
+          </a:xfrm>
+          <a:prstGeom prst="rightArrow">
+            <a:avLst/>
+          </a:prstGeom>
+          <a:noFill/>
+        </p:spPr>
+        <p:style>
+          <a:lnRef idx="2">
+            <a:schemeClr val="accent1">
+              <a:shade val="50000"/>
+            </a:schemeClr>
+          </a:lnRef>
+          <a:fillRef idx="1">
+            <a:schemeClr val="accent1"/>
+          </a:fillRef>
+          <a:effectRef idx="0">
+            <a:schemeClr val="accent1"/>
+          </a:effectRef>
+          <a:fontRef idx="minor">
+            <a:schemeClr val="lt1"/>
+          </a:fontRef>
+        </p:style>
+        <p:txBody>
+          <a:bodyPr rtlCol="0" anchor="ctr"/>
+          <a:lstStyle/>
+          <a:p>
+            <a:pPr algn="ctr"/>
+            <a:endParaRPr lang="en-US" dirty="0"/>
+          </a:p>
+        </p:txBody>
+      </p:sp>
+      <p:sp>
+        <p:nvSpPr>
+          <p:cNvPr id="43" name="Arrow: Right 42">
+            <a:extLst>
+              <a:ext uri="{FF2B5EF4-FFF2-40B4-BE49-F238E27FC236}">
+                <a16:creationId xmlns:a16="http://schemas.microsoft.com/office/drawing/2014/main" id="{2DFFA233-5980-EE89-DDE2-E6FE60F43B00}"/>
+              </a:ext>
+            </a:extLst>
+          </p:cNvPr>
+          <p:cNvSpPr/>
+          <p:nvPr/>
+        </p:nvSpPr>
+        <p:spPr>
+          <a:xfrm rot="14040195">
+            <a:off x="2542463" y="4169961"/>
+            <a:ext cx="2025124" cy="378982"/>
+          </a:xfrm>
+          <a:prstGeom prst="rightArrow">
+            <a:avLst/>
+          </a:prstGeom>
+          <a:noFill/>
+        </p:spPr>
+        <p:style>
+          <a:lnRef idx="2">
+            <a:schemeClr val="accent1">
+              <a:shade val="50000"/>
+            </a:schemeClr>
+          </a:lnRef>
+          <a:fillRef idx="1">
+            <a:schemeClr val="accent1"/>
+          </a:fillRef>
+          <a:effectRef idx="0">
+            <a:schemeClr val="accent1"/>
+          </a:effectRef>
+          <a:fontRef idx="minor">
+            <a:schemeClr val="lt1"/>
+          </a:fontRef>
+        </p:style>
+        <p:txBody>
+          <a:bodyPr rtlCol="0" anchor="ctr"/>
+          <a:lstStyle/>
+          <a:p>
+            <a:pPr algn="ctr"/>
+            <a:endParaRPr lang="en-US" dirty="0"/>
+          </a:p>
+        </p:txBody>
+      </p:sp>
+      <p:grpSp>
+        <p:nvGrpSpPr>
+          <p:cNvPr id="47" name="Group 46">
+            <a:extLst>
+              <a:ext uri="{FF2B5EF4-FFF2-40B4-BE49-F238E27FC236}">
+                <a16:creationId xmlns:a16="http://schemas.microsoft.com/office/drawing/2014/main" id="{751254B2-40CB-2B89-459E-264D9BC9824C}"/>
+              </a:ext>
+            </a:extLst>
+          </p:cNvPr>
+          <p:cNvGrpSpPr/>
+          <p:nvPr/>
+        </p:nvGrpSpPr>
+        <p:grpSpPr>
+          <a:xfrm>
+            <a:off x="4326541" y="5225654"/>
+            <a:ext cx="3261920" cy="977135"/>
+            <a:chOff x="4326541" y="5225654"/>
+            <a:chExt cx="3261920" cy="977135"/>
+          </a:xfrm>
+        </p:grpSpPr>
+        <p:grpSp>
+          <p:nvGrpSpPr>
+            <p:cNvPr id="38" name="Group 37">
+              <a:extLst>
+                <a:ext uri="{FF2B5EF4-FFF2-40B4-BE49-F238E27FC236}">
+                  <a16:creationId xmlns:a16="http://schemas.microsoft.com/office/drawing/2014/main" id="{927FAB67-F8D5-836A-A569-AAF15E240ACD}"/>
+                </a:ext>
+              </a:extLst>
+            </p:cNvPr>
+            <p:cNvGrpSpPr/>
+            <p:nvPr/>
+          </p:nvGrpSpPr>
+          <p:grpSpPr>
+            <a:xfrm>
+              <a:off x="4326541" y="5225654"/>
+              <a:ext cx="3261920" cy="893426"/>
+              <a:chOff x="529904" y="2378280"/>
+              <a:chExt cx="3261920" cy="893426"/>
+            </a:xfrm>
+          </p:grpSpPr>
+          <p:sp>
+            <p:nvSpPr>
+              <p:cNvPr id="39" name="Rectangle 38">
+                <a:extLst>
+                  <a:ext uri="{FF2B5EF4-FFF2-40B4-BE49-F238E27FC236}">
+                    <a16:creationId xmlns:a16="http://schemas.microsoft.com/office/drawing/2014/main" id="{EF9F0C7B-9AA8-9F63-AE37-4415C0B4356C}"/>
+                  </a:ext>
+                </a:extLst>
+              </p:cNvPr>
+              <p:cNvSpPr/>
+              <p:nvPr/>
+            </p:nvSpPr>
+            <p:spPr>
+              <a:xfrm>
+                <a:off x="529904" y="2378280"/>
+                <a:ext cx="3261920" cy="893426"/>
+              </a:xfrm>
+              <a:prstGeom prst="rect">
+                <a:avLst/>
+              </a:prstGeom>
+              <a:noFill/>
+            </p:spPr>
+            <p:style>
+              <a:lnRef idx="2">
+                <a:schemeClr val="accent1">
+                  <a:shade val="50000"/>
+                </a:schemeClr>
+              </a:lnRef>
+              <a:fillRef idx="1">
+                <a:schemeClr val="accent1"/>
+              </a:fillRef>
+              <a:effectRef idx="0">
+                <a:schemeClr val="accent1"/>
+              </a:effectRef>
+              <a:fontRef idx="minor">
+                <a:schemeClr val="lt1"/>
+              </a:fontRef>
+            </p:style>
+            <p:txBody>
+              <a:bodyPr rtlCol="0" anchor="ctr"/>
+              <a:lstStyle/>
+              <a:p>
+                <a:pPr algn="ctr"/>
+                <a:endParaRPr lang="en-US"/>
+              </a:p>
+            </p:txBody>
+          </p:sp>
+          <p:sp>
+            <p:nvSpPr>
+              <p:cNvPr id="40" name="TextBox 39">
+                <a:extLst>
+                  <a:ext uri="{FF2B5EF4-FFF2-40B4-BE49-F238E27FC236}">
+                    <a16:creationId xmlns:a16="http://schemas.microsoft.com/office/drawing/2014/main" id="{48ACE175-5136-C782-C108-CB25BFCE6E5C}"/>
+                  </a:ext>
+                </a:extLst>
+              </p:cNvPr>
+              <p:cNvSpPr txBox="1"/>
+              <p:nvPr/>
+            </p:nvSpPr>
+            <p:spPr>
+              <a:xfrm>
+                <a:off x="1175817" y="2396359"/>
+                <a:ext cx="1970091" cy="369332"/>
+              </a:xfrm>
+              <a:prstGeom prst="rect">
+                <a:avLst/>
+              </a:prstGeom>
+              <a:noFill/>
+            </p:spPr>
+            <p:txBody>
+              <a:bodyPr wrap="none" rtlCol="0">
+                <a:spAutoFit/>
+              </a:bodyPr>
+              <a:lstStyle/>
+              <a:p>
+                <a:r>
+                  <a:rPr lang="en-US" dirty="0"/>
+                  <a:t>Clear Replay Buffer</a:t>
+                </a:r>
+              </a:p>
+            </p:txBody>
+          </p:sp>
+        </p:grpSp>
+        <p:sp>
+          <p:nvSpPr>
+            <p:cNvPr id="44" name="TextBox 43">
+              <a:extLst>
+                <a:ext uri="{FF2B5EF4-FFF2-40B4-BE49-F238E27FC236}">
+                  <a16:creationId xmlns:a16="http://schemas.microsoft.com/office/drawing/2014/main" id="{0079CC0F-00D4-1A1D-EBF5-92A1C0A3A143}"/>
+                </a:ext>
+              </a:extLst>
+            </p:cNvPr>
+            <p:cNvSpPr txBox="1"/>
+            <p:nvPr/>
+          </p:nvSpPr>
+          <p:spPr>
+            <a:xfrm>
+              <a:off x="6341135" y="5494903"/>
+              <a:ext cx="487634" cy="707886"/>
+            </a:xfrm>
+            <a:prstGeom prst="rect">
+              <a:avLst/>
+            </a:prstGeom>
+            <a:noFill/>
+          </p:spPr>
+          <p:txBody>
+            <a:bodyPr wrap="none" rtlCol="0">
+              <a:spAutoFit/>
+            </a:bodyPr>
+            <a:lstStyle/>
+            <a:p>
+              <a:r>
+                <a:rPr lang="en-US" sz="4000" dirty="0">
+                  <a:latin typeface="Algerian" panose="020B0604020202020204" pitchFamily="82" charset="0"/>
+                </a:rPr>
+                <a:t>P</a:t>
+              </a:r>
+            </a:p>
+          </p:txBody>
+        </p:sp>
+        <p:sp>
+          <p:nvSpPr>
+            <p:cNvPr id="45" name="TextBox 44">
+              <a:extLst>
+                <a:ext uri="{FF2B5EF4-FFF2-40B4-BE49-F238E27FC236}">
+                  <a16:creationId xmlns:a16="http://schemas.microsoft.com/office/drawing/2014/main" id="{669BABD0-3E05-1455-3446-8E6332F52A37}"/>
+                </a:ext>
+              </a:extLst>
+            </p:cNvPr>
+            <p:cNvSpPr txBox="1"/>
+            <p:nvPr/>
+          </p:nvSpPr>
+          <p:spPr>
+            <a:xfrm>
+              <a:off x="5077197" y="5456206"/>
+              <a:ext cx="513282" cy="707886"/>
+            </a:xfrm>
+            <a:prstGeom prst="rect">
+              <a:avLst/>
+            </a:prstGeom>
+            <a:noFill/>
+          </p:spPr>
+          <p:txBody>
+            <a:bodyPr wrap="none" rtlCol="0">
+              <a:spAutoFit/>
+            </a:bodyPr>
+            <a:lstStyle/>
+            <a:p>
+              <a:r>
+                <a:rPr lang="en-US" sz="4000" dirty="0">
+                  <a:latin typeface="Algerian" panose="020B0604020202020204" pitchFamily="82" charset="0"/>
+                </a:rPr>
+                <a:t>Q</a:t>
+              </a:r>
+            </a:p>
+          </p:txBody>
+        </p:sp>
+        <p:sp>
+          <p:nvSpPr>
+            <p:cNvPr id="46" name="Arrow: Right 45">
+              <a:extLst>
+                <a:ext uri="{FF2B5EF4-FFF2-40B4-BE49-F238E27FC236}">
+                  <a16:creationId xmlns:a16="http://schemas.microsoft.com/office/drawing/2014/main" id="{70AC6E17-B72E-C645-D93E-D238BA8ABFB0}"/>
+                </a:ext>
+              </a:extLst>
+            </p:cNvPr>
+            <p:cNvSpPr/>
+            <p:nvPr/>
+          </p:nvSpPr>
+          <p:spPr>
+            <a:xfrm rot="10800000">
+              <a:off x="5654115" y="5728341"/>
+              <a:ext cx="606772" cy="241010"/>
+            </a:xfrm>
+            <a:prstGeom prst="rightArrow">
+              <a:avLst/>
+            </a:prstGeom>
+            <a:noFill/>
+          </p:spPr>
+          <p:style>
+            <a:lnRef idx="2">
+              <a:schemeClr val="accent1">
+                <a:shade val="50000"/>
+              </a:schemeClr>
+            </a:lnRef>
+            <a:fillRef idx="1">
+              <a:schemeClr val="accent1"/>
+            </a:fillRef>
+            <a:effectRef idx="0">
+              <a:schemeClr val="accent1"/>
+            </a:effectRef>
+            <a:fontRef idx="minor">
+              <a:schemeClr val="lt1"/>
+            </a:fontRef>
+          </p:style>
+          <p:txBody>
+            <a:bodyPr rtlCol="0" anchor="ctr"/>
+            <a:lstStyle/>
+            <a:p>
+              <a:pPr algn="ctr"/>
+              <a:endParaRPr lang="en-US"/>
+            </a:p>
+          </p:txBody>
+        </p:sp>
+      </p:grpSp>
+      <p:graphicFrame>
+        <p:nvGraphicFramePr>
+          <p:cNvPr id="3" name="Table 3">
+            <a:extLst>
+              <a:ext uri="{FF2B5EF4-FFF2-40B4-BE49-F238E27FC236}">
+                <a16:creationId xmlns:a16="http://schemas.microsoft.com/office/drawing/2014/main" id="{999990CD-D5D6-7FB0-F28D-D3438A42C402}"/>
+              </a:ext>
+            </a:extLst>
+          </p:cNvPr>
+          <p:cNvGraphicFramePr>
+            <a:graphicFrameLocks noGrp="1"/>
+          </p:cNvGraphicFramePr>
+          <p:nvPr>
+            <p:extLst>
+              <p:ext uri="{D42A27DB-BD31-4B8C-83A1-F6EECF244321}">
+                <p14:modId xmlns:p14="http://schemas.microsoft.com/office/powerpoint/2010/main" val="883226851"/>
+              </p:ext>
+            </p:extLst>
+          </p:nvPr>
+        </p:nvGraphicFramePr>
+        <p:xfrm>
+          <a:off x="266176" y="226654"/>
+          <a:ext cx="4337484" cy="1559560"/>
+        </p:xfrm>
+        <a:graphic>
+          <a:graphicData uri="http://schemas.openxmlformats.org/drawingml/2006/table">
+            <a:tbl>
+              <a:tblPr firstRow="1" bandRow="1">
+                <a:tableStyleId>{69CF1AB2-1976-4502-BF36-3FF5EA218861}</a:tableStyleId>
+              </a:tblPr>
+              <a:tblGrid>
+                <a:gridCol w="2168742">
+                  <a:extLst>
+                    <a:ext uri="{9D8B030D-6E8A-4147-A177-3AD203B41FA5}">
+                      <a16:colId xmlns:a16="http://schemas.microsoft.com/office/drawing/2014/main" val="403995306"/>
+                    </a:ext>
+                  </a:extLst>
+                </a:gridCol>
+                <a:gridCol w="2168742">
+                  <a:extLst>
+                    <a:ext uri="{9D8B030D-6E8A-4147-A177-3AD203B41FA5}">
+                      <a16:colId xmlns:a16="http://schemas.microsoft.com/office/drawing/2014/main" val="3886721784"/>
+                    </a:ext>
+                  </a:extLst>
+                </a:gridCol>
+              </a:tblGrid>
+              <a:tr h="370840">
+                <a:tc>
+                  <a:txBody>
+                    <a:bodyPr/>
+                    <a:lstStyle/>
+                    <a:p>
+                      <a:r>
+                        <a:rPr lang="en-US" b="0" dirty="0">
+                          <a:solidFill>
+                            <a:schemeClr val="tx1"/>
+                          </a:solidFill>
+                        </a:rPr>
+                        <a:t>RL like features</a:t>
+                      </a:r>
+                    </a:p>
+                  </a:txBody>
+                  <a:tcPr>
+                    <a:noFill/>
+                  </a:tcPr>
+                </a:tc>
+                <a:tc>
+                  <a:txBody>
+                    <a:bodyPr/>
+                    <a:lstStyle/>
+                    <a:p>
+                      <a:r>
+                        <a:rPr lang="en-US" b="0" dirty="0">
+                          <a:solidFill>
+                            <a:schemeClr val="tx1"/>
+                          </a:solidFill>
+                        </a:rPr>
+                        <a:t>Non RL features</a:t>
+                      </a:r>
+                    </a:p>
+                  </a:txBody>
+                  <a:tcPr>
+                    <a:noFill/>
+                  </a:tcPr>
+                </a:tc>
+                <a:extLst>
+                  <a:ext uri="{0D108BD9-81ED-4DB2-BD59-A6C34878D82A}">
+                    <a16:rowId xmlns:a16="http://schemas.microsoft.com/office/drawing/2014/main" val="2664377670"/>
+                  </a:ext>
+                </a:extLst>
+              </a:tr>
+              <a:tr h="370840">
+                <a:tc>
+                  <a:txBody>
+                    <a:bodyPr/>
+                    <a:lstStyle/>
+                    <a:p>
+                      <a:r>
+                        <a:rPr lang="en-US" dirty="0">
+                          <a:solidFill>
+                            <a:schemeClr val="tx1"/>
+                          </a:solidFill>
+                        </a:rPr>
+                        <a:t>Reward Function</a:t>
+                      </a:r>
+                    </a:p>
+                  </a:txBody>
+                  <a:tcPr>
+                    <a:noFill/>
+                  </a:tcPr>
+                </a:tc>
+                <a:tc>
+                  <a:txBody>
+                    <a:bodyPr/>
+                    <a:lstStyle/>
+                    <a:p>
+                      <a:r>
+                        <a:rPr lang="en-US" dirty="0">
+                          <a:solidFill>
+                            <a:schemeClr val="tx1"/>
+                          </a:solidFill>
+                        </a:rPr>
+                        <a:t>Random Exploration</a:t>
+                      </a:r>
+                    </a:p>
+                    <a:p>
+                      <a:r>
+                        <a:rPr lang="en-US" dirty="0">
+                          <a:solidFill>
+                            <a:schemeClr val="tx1"/>
+                          </a:solidFill>
+                        </a:rPr>
+                        <a:t>Predictive Loss</a:t>
+                      </a:r>
+                    </a:p>
+                    <a:p>
+                      <a:r>
+                        <a:rPr lang="en-US" dirty="0">
+                          <a:solidFill>
+                            <a:schemeClr val="tx1"/>
+                          </a:solidFill>
+                        </a:rPr>
+                        <a:t>Goal Specified in prompt, not training</a:t>
+                      </a:r>
+                    </a:p>
+                  </a:txBody>
+                  <a:tcPr>
+                    <a:noFill/>
+                  </a:tcPr>
+                </a:tc>
+                <a:extLst>
+                  <a:ext uri="{0D108BD9-81ED-4DB2-BD59-A6C34878D82A}">
+                    <a16:rowId xmlns:a16="http://schemas.microsoft.com/office/drawing/2014/main" val="630940841"/>
+                  </a:ext>
+                </a:extLst>
+              </a:tr>
+            </a:tbl>
+          </a:graphicData>
+        </a:graphic>
+      </p:graphicFrame>
+    </p:spTree>
+    <p:extLst>
+      <p:ext uri="{BB962C8B-B14F-4D97-AF65-F5344CB8AC3E}">
+        <p14:creationId xmlns:p14="http://schemas.microsoft.com/office/powerpoint/2010/main" val="3557891827"/>
+      </p:ext>
+    </p:extLst>
+  </p:cSld>
+  <p:clrMapOvr>
+    <a:masterClrMapping/>
+  </p:clrMapOvr>
+</p:sld>
+</file>
+
+<file path=ppt/slides/slide5.xml><?xml version="1.0" encoding="utf-8"?>
+<p:sld xmlns:a="http://schemas.openxmlformats.org/drawingml/2006/main" xmlns:r="http://schemas.openxmlformats.org/officeDocument/2006/relationships" xmlns:p="http://schemas.openxmlformats.org/presentationml/2006/main">
+  <p:cSld>
+    <p:spTree>
+      <p:nvGrpSpPr>
+        <p:cNvPr id="1" name=""/>
+        <p:cNvGrpSpPr/>
+        <p:nvPr/>
+      </p:nvGrpSpPr>
+      <p:grpSpPr>
+        <a:xfrm>
+          <a:off x="0" y="0"/>
+          <a:ext cx="0" cy="0"/>
+          <a:chOff x="0" y="0"/>
+          <a:chExt cx="0" cy="0"/>
+        </a:xfrm>
+      </p:grpSpPr>
+      <p:sp>
+        <p:nvSpPr>
+          <p:cNvPr id="2" name="Title 1">
+            <a:extLst>
+              <a:ext uri="{FF2B5EF4-FFF2-40B4-BE49-F238E27FC236}">
+                <a16:creationId xmlns:a16="http://schemas.microsoft.com/office/drawing/2014/main" id="{CF00585C-5935-39EE-7E46-1843F4C8808D}"/>
+              </a:ext>
+            </a:extLst>
+          </p:cNvPr>
+          <p:cNvSpPr>
+            <a:spLocks noGrp="1"/>
+          </p:cNvSpPr>
+          <p:nvPr>
+            <p:ph type="title"/>
+          </p:nvPr>
+        </p:nvSpPr>
+        <p:spPr>
+          <a:xfrm>
+            <a:off x="699699" y="383007"/>
+            <a:ext cx="10515600" cy="1325563"/>
+          </a:xfrm>
+        </p:spPr>
+        <p:txBody>
+          <a:bodyPr/>
+          <a:lstStyle/>
+          <a:p>
+            <a:pPr algn="ctr"/>
+            <a:r>
+              <a:rPr lang="en-US" dirty="0"/>
+              <a:t>GEM</a:t>
+            </a:r>
+          </a:p>
+        </p:txBody>
+      </p:sp>
+      <p:graphicFrame>
+        <p:nvGraphicFramePr>
+          <p:cNvPr id="3" name="Table 3">
+            <a:extLst>
+              <a:ext uri="{FF2B5EF4-FFF2-40B4-BE49-F238E27FC236}">
+                <a16:creationId xmlns:a16="http://schemas.microsoft.com/office/drawing/2014/main" id="{999990CD-D5D6-7FB0-F28D-D3438A42C402}"/>
+              </a:ext>
+            </a:extLst>
+          </p:cNvPr>
+          <p:cNvGraphicFramePr>
+            <a:graphicFrameLocks noGrp="1"/>
+          </p:cNvGraphicFramePr>
+          <p:nvPr>
+            <p:extLst>
+              <p:ext uri="{D42A27DB-BD31-4B8C-83A1-F6EECF244321}">
+                <p14:modId xmlns:p14="http://schemas.microsoft.com/office/powerpoint/2010/main" val="3097039266"/>
+              </p:ext>
+            </p:extLst>
+          </p:nvPr>
+        </p:nvGraphicFramePr>
+        <p:xfrm>
+          <a:off x="266176" y="226654"/>
+          <a:ext cx="4337484" cy="1010920"/>
+        </p:xfrm>
+        <a:graphic>
+          <a:graphicData uri="http://schemas.openxmlformats.org/drawingml/2006/table">
+            <a:tbl>
+              <a:tblPr firstRow="1" bandRow="1">
+                <a:tableStyleId>{69CF1AB2-1976-4502-BF36-3FF5EA218861}</a:tableStyleId>
+              </a:tblPr>
+              <a:tblGrid>
+                <a:gridCol w="2168742">
+                  <a:extLst>
+                    <a:ext uri="{9D8B030D-6E8A-4147-A177-3AD203B41FA5}">
+                      <a16:colId xmlns:a16="http://schemas.microsoft.com/office/drawing/2014/main" val="403995306"/>
+                    </a:ext>
+                  </a:extLst>
+                </a:gridCol>
+                <a:gridCol w="2168742">
+                  <a:extLst>
+                    <a:ext uri="{9D8B030D-6E8A-4147-A177-3AD203B41FA5}">
+                      <a16:colId xmlns:a16="http://schemas.microsoft.com/office/drawing/2014/main" val="3886721784"/>
+                    </a:ext>
+                  </a:extLst>
+                </a:gridCol>
+              </a:tblGrid>
+              <a:tr h="370840">
+                <a:tc>
+                  <a:txBody>
+                    <a:bodyPr/>
+                    <a:lstStyle/>
+                    <a:p>
+                      <a:r>
+                        <a:rPr lang="en-US" b="0" dirty="0">
+                          <a:solidFill>
+                            <a:schemeClr val="tx1"/>
+                          </a:solidFill>
+                        </a:rPr>
+                        <a:t>RL like features</a:t>
+                      </a:r>
+                    </a:p>
+                  </a:txBody>
+                  <a:tcPr>
+                    <a:noFill/>
+                  </a:tcPr>
+                </a:tc>
+                <a:tc>
+                  <a:txBody>
+                    <a:bodyPr/>
+                    <a:lstStyle/>
+                    <a:p>
+                      <a:r>
+                        <a:rPr lang="en-US" b="0" dirty="0">
+                          <a:solidFill>
+                            <a:schemeClr val="tx1"/>
+                          </a:solidFill>
+                        </a:rPr>
+                        <a:t>Non RL features</a:t>
+                      </a:r>
+                    </a:p>
+                  </a:txBody>
+                  <a:tcPr>
+                    <a:noFill/>
+                  </a:tcPr>
+                </a:tc>
+                <a:extLst>
+                  <a:ext uri="{0D108BD9-81ED-4DB2-BD59-A6C34878D82A}">
+                    <a16:rowId xmlns:a16="http://schemas.microsoft.com/office/drawing/2014/main" val="2664377670"/>
+                  </a:ext>
+                </a:extLst>
+              </a:tr>
+              <a:tr h="370840">
+                <a:tc>
+                  <a:txBody>
+                    <a:bodyPr/>
+                    <a:lstStyle/>
+                    <a:p>
+                      <a:r>
+                        <a:rPr lang="en-US" dirty="0">
+                          <a:solidFill>
+                            <a:schemeClr val="tx1"/>
+                          </a:solidFill>
+                        </a:rPr>
+                        <a:t>On Policy Exploration</a:t>
+                      </a:r>
+                    </a:p>
+                  </a:txBody>
+                  <a:tcPr>
+                    <a:noFill/>
+                  </a:tcPr>
+                </a:tc>
+                <a:tc>
+                  <a:txBody>
+                    <a:bodyPr/>
+                    <a:lstStyle/>
+                    <a:p>
+                      <a:r>
+                        <a:rPr lang="en-US" dirty="0">
+                          <a:solidFill>
+                            <a:schemeClr val="tx1"/>
+                          </a:solidFill>
+                        </a:rPr>
+                        <a:t>Language Feedback, no reward function</a:t>
+                      </a:r>
+                    </a:p>
+                  </a:txBody>
+                  <a:tcPr>
+                    <a:noFill/>
+                  </a:tcPr>
+                </a:tc>
+                <a:extLst>
+                  <a:ext uri="{0D108BD9-81ED-4DB2-BD59-A6C34878D82A}">
+                    <a16:rowId xmlns:a16="http://schemas.microsoft.com/office/drawing/2014/main" val="630940841"/>
+                  </a:ext>
+                </a:extLst>
+              </a:tr>
+            </a:tbl>
+          </a:graphicData>
+        </a:graphic>
+      </p:graphicFrame>
+      <p:grpSp>
+        <p:nvGrpSpPr>
+          <p:cNvPr id="41" name="Group 40">
+            <a:extLst>
+              <a:ext uri="{FF2B5EF4-FFF2-40B4-BE49-F238E27FC236}">
+                <a16:creationId xmlns:a16="http://schemas.microsoft.com/office/drawing/2014/main" id="{F89C39A9-9D4F-8440-2998-8429FE22EBA1}"/>
+              </a:ext>
+            </a:extLst>
+          </p:cNvPr>
+          <p:cNvGrpSpPr/>
+          <p:nvPr/>
+        </p:nvGrpSpPr>
+        <p:grpSpPr>
+          <a:xfrm>
+            <a:off x="266176" y="3808603"/>
+            <a:ext cx="2843868" cy="2729808"/>
+            <a:chOff x="266176" y="3808603"/>
+            <a:chExt cx="2843868" cy="2729808"/>
+          </a:xfrm>
+        </p:grpSpPr>
+        <p:grpSp>
+          <p:nvGrpSpPr>
+            <p:cNvPr id="30" name="Group 29">
+              <a:extLst>
+                <a:ext uri="{FF2B5EF4-FFF2-40B4-BE49-F238E27FC236}">
+                  <a16:creationId xmlns:a16="http://schemas.microsoft.com/office/drawing/2014/main" id="{7F68789B-3B03-85BD-EF03-9C76DC99E3F7}"/>
+                </a:ext>
+              </a:extLst>
+            </p:cNvPr>
+            <p:cNvGrpSpPr/>
+            <p:nvPr/>
+          </p:nvGrpSpPr>
+          <p:grpSpPr>
+            <a:xfrm>
+              <a:off x="266176" y="3808603"/>
+              <a:ext cx="2843868" cy="2729808"/>
+              <a:chOff x="9244668" y="102508"/>
+              <a:chExt cx="2843868" cy="1858675"/>
+            </a:xfrm>
+          </p:grpSpPr>
+          <p:sp>
+            <p:nvSpPr>
+              <p:cNvPr id="31" name="TextBox 30">
+                <a:extLst>
+                  <a:ext uri="{FF2B5EF4-FFF2-40B4-BE49-F238E27FC236}">
+                    <a16:creationId xmlns:a16="http://schemas.microsoft.com/office/drawing/2014/main" id="{4BCAFDDB-08C3-B443-2A7E-34C84735C351}"/>
+                  </a:ext>
+                </a:extLst>
+              </p:cNvPr>
+              <p:cNvSpPr txBox="1"/>
+              <p:nvPr/>
+            </p:nvSpPr>
+            <p:spPr>
+              <a:xfrm>
+                <a:off x="11320230" y="102508"/>
+                <a:ext cx="510076" cy="707886"/>
+              </a:xfrm>
+              <a:prstGeom prst="rect">
+                <a:avLst/>
+              </a:prstGeom>
+              <a:noFill/>
+            </p:spPr>
+            <p:txBody>
+              <a:bodyPr wrap="none" rtlCol="0">
+                <a:spAutoFit/>
+              </a:bodyPr>
+              <a:lstStyle/>
+              <a:p>
+                <a:r>
+                  <a:rPr lang="en-US" sz="4000" dirty="0">
+                    <a:latin typeface="Algerian" panose="020B0604020202020204" pitchFamily="82" charset="0"/>
+                  </a:rPr>
+                  <a:t>R</a:t>
+                </a:r>
+              </a:p>
+            </p:txBody>
+          </p:sp>
+          <p:sp>
+            <p:nvSpPr>
+              <p:cNvPr id="32" name="TextBox 31">
+                <a:extLst>
+                  <a:ext uri="{FF2B5EF4-FFF2-40B4-BE49-F238E27FC236}">
+                    <a16:creationId xmlns:a16="http://schemas.microsoft.com/office/drawing/2014/main" id="{916ED44E-03CF-4C71-7C58-4202DF7C6DB5}"/>
+                  </a:ext>
+                </a:extLst>
+              </p:cNvPr>
+              <p:cNvSpPr txBox="1"/>
+              <p:nvPr/>
+            </p:nvSpPr>
+            <p:spPr>
+              <a:xfrm>
+                <a:off x="9458120" y="279480"/>
+                <a:ext cx="2139192" cy="369332"/>
+              </a:xfrm>
+              <a:prstGeom prst="rect">
+                <a:avLst/>
+              </a:prstGeom>
+              <a:noFill/>
+            </p:spPr>
+            <p:txBody>
+              <a:bodyPr wrap="square" rtlCol="0">
+                <a:spAutoFit/>
+              </a:bodyPr>
+              <a:lstStyle/>
+              <a:p>
+                <a:r>
+                  <a:rPr lang="en-US" dirty="0"/>
+                  <a:t>Reference Model</a:t>
+                </a:r>
+              </a:p>
+            </p:txBody>
+          </p:sp>
+          <p:sp>
+            <p:nvSpPr>
+              <p:cNvPr id="33" name="TextBox 32">
+                <a:extLst>
+                  <a:ext uri="{FF2B5EF4-FFF2-40B4-BE49-F238E27FC236}">
+                    <a16:creationId xmlns:a16="http://schemas.microsoft.com/office/drawing/2014/main" id="{C0207A33-81BB-E189-8C15-D1E78BE7993E}"/>
+                  </a:ext>
+                </a:extLst>
+              </p:cNvPr>
+              <p:cNvSpPr txBox="1"/>
+              <p:nvPr/>
+            </p:nvSpPr>
+            <p:spPr>
+              <a:xfrm>
+                <a:off x="11320230" y="518006"/>
+                <a:ext cx="487634" cy="707886"/>
+              </a:xfrm>
+              <a:prstGeom prst="rect">
+                <a:avLst/>
+              </a:prstGeom>
+              <a:noFill/>
+            </p:spPr>
+            <p:txBody>
+              <a:bodyPr wrap="none" rtlCol="0">
+                <a:spAutoFit/>
+              </a:bodyPr>
+              <a:lstStyle/>
+              <a:p>
+                <a:r>
+                  <a:rPr lang="en-US" sz="4000" dirty="0">
+                    <a:latin typeface="Algerian" panose="020B0604020202020204" pitchFamily="82" charset="0"/>
+                  </a:rPr>
+                  <a:t>P</a:t>
+                </a:r>
+              </a:p>
+            </p:txBody>
+          </p:sp>
+          <p:sp>
+            <p:nvSpPr>
+              <p:cNvPr id="34" name="TextBox 33">
+                <a:extLst>
+                  <a:ext uri="{FF2B5EF4-FFF2-40B4-BE49-F238E27FC236}">
+                    <a16:creationId xmlns:a16="http://schemas.microsoft.com/office/drawing/2014/main" id="{60B74FC6-272E-1E7D-CDF0-AA8FCEE3507B}"/>
+                  </a:ext>
+                </a:extLst>
+              </p:cNvPr>
+              <p:cNvSpPr txBox="1"/>
+              <p:nvPr/>
+            </p:nvSpPr>
+            <p:spPr>
+              <a:xfrm>
+                <a:off x="9468552" y="641117"/>
+                <a:ext cx="2139192" cy="369332"/>
+              </a:xfrm>
+              <a:prstGeom prst="rect">
+                <a:avLst/>
+              </a:prstGeom>
+              <a:noFill/>
+            </p:spPr>
+            <p:txBody>
+              <a:bodyPr wrap="square" rtlCol="0">
+                <a:spAutoFit/>
+              </a:bodyPr>
+              <a:lstStyle/>
+              <a:p>
+                <a:r>
+                  <a:rPr lang="en-US" dirty="0"/>
+                  <a:t>Current Model</a:t>
+                </a:r>
+              </a:p>
+            </p:txBody>
+          </p:sp>
+          <p:sp>
+            <p:nvSpPr>
+              <p:cNvPr id="35" name="TextBox 34">
+                <a:extLst>
+                  <a:ext uri="{FF2B5EF4-FFF2-40B4-BE49-F238E27FC236}">
+                    <a16:creationId xmlns:a16="http://schemas.microsoft.com/office/drawing/2014/main" id="{D4DB3BD0-6CA6-A5BC-F54F-9E13BF471F3C}"/>
+                  </a:ext>
+                </a:extLst>
+              </p:cNvPr>
+              <p:cNvSpPr txBox="1"/>
+              <p:nvPr/>
+            </p:nvSpPr>
+            <p:spPr>
+              <a:xfrm>
+                <a:off x="11307406" y="854095"/>
+                <a:ext cx="513282" cy="707886"/>
+              </a:xfrm>
+              <a:prstGeom prst="rect">
+                <a:avLst/>
+              </a:prstGeom>
+              <a:noFill/>
+            </p:spPr>
+            <p:txBody>
+              <a:bodyPr wrap="none" rtlCol="0">
+                <a:spAutoFit/>
+              </a:bodyPr>
+              <a:lstStyle/>
+              <a:p>
+                <a:r>
+                  <a:rPr lang="en-US" sz="4000" dirty="0">
+                    <a:latin typeface="Algerian" panose="020B0604020202020204" pitchFamily="82" charset="0"/>
+                  </a:rPr>
+                  <a:t>Q</a:t>
+                </a:r>
+              </a:p>
+            </p:txBody>
+          </p:sp>
+          <p:sp>
+            <p:nvSpPr>
+              <p:cNvPr id="36" name="TextBox 35">
+                <a:extLst>
+                  <a:ext uri="{FF2B5EF4-FFF2-40B4-BE49-F238E27FC236}">
+                    <a16:creationId xmlns:a16="http://schemas.microsoft.com/office/drawing/2014/main" id="{BBFE9A7E-C3D0-E5AE-A47A-8ED6842B07E4}"/>
+                  </a:ext>
+                </a:extLst>
+              </p:cNvPr>
+              <p:cNvSpPr txBox="1"/>
+              <p:nvPr/>
+            </p:nvSpPr>
+            <p:spPr>
+              <a:xfrm>
+                <a:off x="9458120" y="933505"/>
+                <a:ext cx="2139192" cy="615553"/>
+              </a:xfrm>
+              <a:prstGeom prst="rect">
+                <a:avLst/>
+              </a:prstGeom>
+              <a:noFill/>
+            </p:spPr>
+            <p:txBody>
+              <a:bodyPr wrap="square" rtlCol="0">
+                <a:spAutoFit/>
+              </a:bodyPr>
+              <a:lstStyle/>
+              <a:p>
+                <a:r>
+                  <a:rPr lang="en-US" dirty="0"/>
+                  <a:t>Last Model</a:t>
+                </a:r>
+              </a:p>
+              <a:p>
+                <a:r>
+                  <a:rPr lang="en-US" sz="800" dirty="0"/>
+                  <a:t>*Cached values only </a:t>
+                </a:r>
+              </a:p>
+              <a:p>
+                <a:r>
+                  <a:rPr lang="en-US" sz="800" dirty="0"/>
+                  <a:t>not stored as a model</a:t>
+                </a:r>
+              </a:p>
+            </p:txBody>
+          </p:sp>
+          <p:sp>
+            <p:nvSpPr>
+              <p:cNvPr id="37" name="Rectangle 36">
+                <a:extLst>
+                  <a:ext uri="{FF2B5EF4-FFF2-40B4-BE49-F238E27FC236}">
+                    <a16:creationId xmlns:a16="http://schemas.microsoft.com/office/drawing/2014/main" id="{72FA7BD8-5B4C-2420-AD18-323C25ADB765}"/>
+                  </a:ext>
+                </a:extLst>
+              </p:cNvPr>
+              <p:cNvSpPr/>
+              <p:nvPr/>
+            </p:nvSpPr>
+            <p:spPr>
+              <a:xfrm>
+                <a:off x="9244668" y="102508"/>
+                <a:ext cx="2843868" cy="1858675"/>
+              </a:xfrm>
+              <a:prstGeom prst="rect">
+                <a:avLst/>
+              </a:prstGeom>
+              <a:noFill/>
+            </p:spPr>
+            <p:style>
+              <a:lnRef idx="2">
+                <a:schemeClr val="accent1">
+                  <a:shade val="50000"/>
+                </a:schemeClr>
+              </a:lnRef>
+              <a:fillRef idx="1">
+                <a:schemeClr val="accent1"/>
+              </a:fillRef>
+              <a:effectRef idx="0">
+                <a:schemeClr val="accent1"/>
+              </a:effectRef>
+              <a:fontRef idx="minor">
+                <a:schemeClr val="lt1"/>
+              </a:fontRef>
+            </p:style>
+            <p:txBody>
+              <a:bodyPr rtlCol="0" anchor="ctr"/>
+              <a:lstStyle/>
+              <a:p>
+                <a:pPr algn="ctr"/>
+                <a:endParaRPr lang="en-US"/>
+              </a:p>
+            </p:txBody>
+          </p:sp>
+        </p:grpSp>
+        <p:sp>
+          <p:nvSpPr>
+            <p:cNvPr id="16" name="TextBox 15">
+              <a:extLst>
+                <a:ext uri="{FF2B5EF4-FFF2-40B4-BE49-F238E27FC236}">
+                  <a16:creationId xmlns:a16="http://schemas.microsoft.com/office/drawing/2014/main" id="{DF15BA46-5994-F7B7-EFCF-0AA4E1AA0427}"/>
+                </a:ext>
+              </a:extLst>
+            </p:cNvPr>
+            <p:cNvSpPr txBox="1"/>
+            <p:nvPr/>
+          </p:nvSpPr>
+          <p:spPr>
+            <a:xfrm>
+              <a:off x="490060" y="5695815"/>
+              <a:ext cx="2139192" cy="369332"/>
+            </a:xfrm>
+            <a:prstGeom prst="rect">
+              <a:avLst/>
+            </a:prstGeom>
+            <a:noFill/>
+          </p:spPr>
+          <p:txBody>
+            <a:bodyPr wrap="square" rtlCol="0">
+              <a:spAutoFit/>
+            </a:bodyPr>
+            <a:lstStyle/>
+            <a:p>
+              <a:r>
+                <a:rPr lang="en-US" dirty="0"/>
+                <a:t>Teacher Model</a:t>
+              </a:r>
+            </a:p>
+          </p:txBody>
+        </p:sp>
+        <p:sp>
+          <p:nvSpPr>
+            <p:cNvPr id="23" name="TextBox 22">
+              <a:extLst>
+                <a:ext uri="{FF2B5EF4-FFF2-40B4-BE49-F238E27FC236}">
+                  <a16:creationId xmlns:a16="http://schemas.microsoft.com/office/drawing/2014/main" id="{6D20FCD6-32A0-3A42-9D18-8DF4B90F62BF}"/>
+                </a:ext>
+              </a:extLst>
+            </p:cNvPr>
+            <p:cNvSpPr txBox="1"/>
+            <p:nvPr/>
+          </p:nvSpPr>
+          <p:spPr>
+            <a:xfrm>
+              <a:off x="2344944" y="5522683"/>
+              <a:ext cx="481222" cy="707886"/>
+            </a:xfrm>
+            <a:prstGeom prst="rect">
+              <a:avLst/>
+            </a:prstGeom>
+            <a:noFill/>
+          </p:spPr>
+          <p:txBody>
+            <a:bodyPr wrap="none" rtlCol="0">
+              <a:spAutoFit/>
+            </a:bodyPr>
+            <a:lstStyle/>
+            <a:p>
+              <a:r>
+                <a:rPr lang="en-US" sz="4000" dirty="0">
+                  <a:latin typeface="Algerian" panose="020B0604020202020204" pitchFamily="82" charset="0"/>
+                </a:rPr>
+                <a:t>T</a:t>
+              </a:r>
+            </a:p>
+          </p:txBody>
+        </p:sp>
+      </p:grpSp>
+    </p:spTree>
+    <p:extLst>
+      <p:ext uri="{BB962C8B-B14F-4D97-AF65-F5344CB8AC3E}">
+        <p14:creationId xmlns:p14="http://schemas.microsoft.com/office/powerpoint/2010/main" val="1119563180"/>
       </p:ext>
     </p:extLst>
   </p:cSld>

</xml_diff>